<commit_message>
Add Java Client Server application
</commit_message>
<xml_diff>
--- a/clientServerContext.pptx
+++ b/clientServerContext.pptx
@@ -5,13 +5,14 @@
     <p:sldMasterId id="2147483648" r:id="rId1"/>
   </p:sldMasterIdLst>
   <p:notesMasterIdLst>
-    <p:notesMasterId r:id="rId6"/>
+    <p:notesMasterId r:id="rId7"/>
   </p:notesMasterIdLst>
   <p:sldIdLst>
     <p:sldId id="256" r:id="rId2"/>
     <p:sldId id="257" r:id="rId3"/>
     <p:sldId id="258" r:id="rId4"/>
     <p:sldId id="259" r:id="rId5"/>
+    <p:sldId id="260" r:id="rId6"/>
   </p:sldIdLst>
   <p:sldSz cx="9144000" cy="6858000" type="screen4x3"/>
   <p:notesSz cx="6858000" cy="9144000"/>
@@ -196,7 +197,7 @@
             <a:fld id="{F6711DF6-4994-4993-BA0F-734EE7A00DAA}" type="datetimeFigureOut">
               <a:rPr lang="en-US" smtClean="0"/>
               <a:pPr/>
-              <a:t>12/4/2013</a:t>
+              <a:t>12/13/2013</a:t>
             </a:fld>
             <a:endParaRPr lang="en-US"/>
           </a:p>
@@ -644,7 +645,7 @@
             <a:fld id="{B5B0E82B-B04C-412F-B6D0-35AE87C490BB}" type="datetimeFigureOut">
               <a:rPr lang="en-US" smtClean="0"/>
               <a:pPr/>
-              <a:t>12/4/2013</a:t>
+              <a:t>12/13/2013</a:t>
             </a:fld>
             <a:endParaRPr lang="en-US"/>
           </a:p>
@@ -811,7 +812,7 @@
             <a:fld id="{B5B0E82B-B04C-412F-B6D0-35AE87C490BB}" type="datetimeFigureOut">
               <a:rPr lang="en-US" smtClean="0"/>
               <a:pPr/>
-              <a:t>12/4/2013</a:t>
+              <a:t>12/13/2013</a:t>
             </a:fld>
             <a:endParaRPr lang="en-US"/>
           </a:p>
@@ -988,7 +989,7 @@
             <a:fld id="{B5B0E82B-B04C-412F-B6D0-35AE87C490BB}" type="datetimeFigureOut">
               <a:rPr lang="en-US" smtClean="0"/>
               <a:pPr/>
-              <a:t>12/4/2013</a:t>
+              <a:t>12/13/2013</a:t>
             </a:fld>
             <a:endParaRPr lang="en-US"/>
           </a:p>
@@ -1155,7 +1156,7 @@
             <a:fld id="{B5B0E82B-B04C-412F-B6D0-35AE87C490BB}" type="datetimeFigureOut">
               <a:rPr lang="en-US" smtClean="0"/>
               <a:pPr/>
-              <a:t>12/4/2013</a:t>
+              <a:t>12/13/2013</a:t>
             </a:fld>
             <a:endParaRPr lang="en-US"/>
           </a:p>
@@ -1398,7 +1399,7 @@
             <a:fld id="{B5B0E82B-B04C-412F-B6D0-35AE87C490BB}" type="datetimeFigureOut">
               <a:rPr lang="en-US" smtClean="0"/>
               <a:pPr/>
-              <a:t>12/4/2013</a:t>
+              <a:t>12/13/2013</a:t>
             </a:fld>
             <a:endParaRPr lang="en-US"/>
           </a:p>
@@ -1683,7 +1684,7 @@
             <a:fld id="{B5B0E82B-B04C-412F-B6D0-35AE87C490BB}" type="datetimeFigureOut">
               <a:rPr lang="en-US" smtClean="0"/>
               <a:pPr/>
-              <a:t>12/4/2013</a:t>
+              <a:t>12/13/2013</a:t>
             </a:fld>
             <a:endParaRPr lang="en-US"/>
           </a:p>
@@ -2102,7 +2103,7 @@
             <a:fld id="{B5B0E82B-B04C-412F-B6D0-35AE87C490BB}" type="datetimeFigureOut">
               <a:rPr lang="en-US" smtClean="0"/>
               <a:pPr/>
-              <a:t>12/4/2013</a:t>
+              <a:t>12/13/2013</a:t>
             </a:fld>
             <a:endParaRPr lang="en-US"/>
           </a:p>
@@ -2217,7 +2218,7 @@
             <a:fld id="{B5B0E82B-B04C-412F-B6D0-35AE87C490BB}" type="datetimeFigureOut">
               <a:rPr lang="en-US" smtClean="0"/>
               <a:pPr/>
-              <a:t>12/4/2013</a:t>
+              <a:t>12/13/2013</a:t>
             </a:fld>
             <a:endParaRPr lang="en-US"/>
           </a:p>
@@ -2309,7 +2310,7 @@
             <a:fld id="{B5B0E82B-B04C-412F-B6D0-35AE87C490BB}" type="datetimeFigureOut">
               <a:rPr lang="en-US" smtClean="0"/>
               <a:pPr/>
-              <a:t>12/4/2013</a:t>
+              <a:t>12/13/2013</a:t>
             </a:fld>
             <a:endParaRPr lang="en-US"/>
           </a:p>
@@ -2583,7 +2584,7 @@
             <a:fld id="{B5B0E82B-B04C-412F-B6D0-35AE87C490BB}" type="datetimeFigureOut">
               <a:rPr lang="en-US" smtClean="0"/>
               <a:pPr/>
-              <a:t>12/4/2013</a:t>
+              <a:t>12/13/2013</a:t>
             </a:fld>
             <a:endParaRPr lang="en-US"/>
           </a:p>
@@ -2833,7 +2834,7 @@
             <a:fld id="{B5B0E82B-B04C-412F-B6D0-35AE87C490BB}" type="datetimeFigureOut">
               <a:rPr lang="en-US" smtClean="0"/>
               <a:pPr/>
-              <a:t>12/4/2013</a:t>
+              <a:t>12/13/2013</a:t>
             </a:fld>
             <a:endParaRPr lang="en-US"/>
           </a:p>
@@ -3043,7 +3044,7 @@
             <a:fld id="{B5B0E82B-B04C-412F-B6D0-35AE87C490BB}" type="datetimeFigureOut">
               <a:rPr lang="en-US" smtClean="0"/>
               <a:pPr/>
-              <a:t>12/4/2013</a:t>
+              <a:t>12/13/2013</a:t>
             </a:fld>
             <a:endParaRPr lang="en-US"/>
           </a:p>
@@ -4615,13 +4616,8 @@
           <a:p>
             <a:r>
               <a:rPr lang="en-US" sz="3200" dirty="0" smtClean="0"/>
-              <a:t>Connection </a:t>
-            </a:r>
-            <a:r>
-              <a:rPr lang="en-US" sz="3200" dirty="0" smtClean="0"/>
-              <a:t>Request</a:t>
-            </a:r>
-            <a:endParaRPr lang="en-US" sz="3200" dirty="0" smtClean="0"/>
+              <a:t>Connection Request</a:t>
+            </a:r>
           </a:p>
         </p:txBody>
       </p:sp>
@@ -4734,11 +4730,6 @@
               </a:rPr>
               <a:t>Keep on Listening</a:t>
             </a:r>
-            <a:endParaRPr lang="en-US" sz="2400" dirty="0" smtClean="0">
-              <a:solidFill>
-                <a:schemeClr val="bg2"/>
-              </a:solidFill>
-            </a:endParaRPr>
           </a:p>
         </p:txBody>
       </p:sp>
@@ -4768,7 +4759,6 @@
               <a:rPr lang="en-US" sz="3200" dirty="0" smtClean="0"/>
               <a:t>Incoming Connection Request</a:t>
             </a:r>
-            <a:endParaRPr lang="en-US" sz="3200" dirty="0" smtClean="0"/>
           </a:p>
         </p:txBody>
       </p:sp>
@@ -4950,13 +4940,6 @@
               </a:rPr>
               <a:t>Generate Socket</a:t>
             </a:r>
-            <a:endParaRPr lang="en-US" sz="2400" dirty="0" smtClean="0">
-              <a:solidFill>
-                <a:schemeClr val="tx2">
-                  <a:lumMod val="50000"/>
-                </a:schemeClr>
-              </a:solidFill>
-            </a:endParaRPr>
           </a:p>
         </p:txBody>
       </p:sp>
@@ -5028,7 +5011,6 @@
               <a:rPr lang="en-US" sz="3200" dirty="0" smtClean="0"/>
               <a:t>Generated Socket</a:t>
             </a:r>
-            <a:endParaRPr lang="en-US" sz="3200" dirty="0" smtClean="0"/>
           </a:p>
         </p:txBody>
       </p:sp>
@@ -5426,6 +5408,58 @@
       </p:par>
     </p:tnLst>
   </p:timing>
+</p:sld>
+</file>
+
+<file path=ppt/slides/slide5.xml><?xml version="1.0" encoding="utf-8"?>
+<p:sld xmlns:a="http://schemas.openxmlformats.org/drawingml/2006/main" xmlns:r="http://schemas.openxmlformats.org/officeDocument/2006/relationships" xmlns:p="http://schemas.openxmlformats.org/presentationml/2006/main">
+  <p:cSld>
+    <p:spTree>
+      <p:nvGrpSpPr>
+        <p:cNvPr id="1" name=""/>
+        <p:cNvGrpSpPr/>
+        <p:nvPr/>
+      </p:nvGrpSpPr>
+      <p:grpSpPr>
+        <a:xfrm>
+          <a:off x="0" y="0"/>
+          <a:ext cx="0" cy="0"/>
+          <a:chOff x="0" y="0"/>
+          <a:chExt cx="0" cy="0"/>
+        </a:xfrm>
+      </p:grpSpPr>
+      <p:sp>
+        <p:nvSpPr>
+          <p:cNvPr id="3" name="Content Placeholder 2"/>
+          <p:cNvSpPr>
+            <a:spLocks noGrp="1"/>
+          </p:cNvSpPr>
+          <p:nvPr>
+            <p:ph idx="1"/>
+          </p:nvPr>
+        </p:nvSpPr>
+        <p:spPr/>
+        <p:txBody>
+          <a:bodyPr/>
+          <a:lstStyle/>
+          <a:p>
+            <a:r>
+              <a:rPr lang="en-US" dirty="0" smtClean="0"/>
+              <a:t>Source code for code examples http</a:t>
+            </a:r>
+            <a:r>
+              <a:rPr lang="en-US" dirty="0" smtClean="0"/>
+              <a:t>://bit.ly/Jkn6O6</a:t>
+            </a:r>
+            <a:endParaRPr lang="en-US" dirty="0"/>
+          </a:p>
+        </p:txBody>
+      </p:sp>
+    </p:spTree>
+  </p:cSld>
+  <p:clrMapOvr>
+    <a:masterClrMapping/>
+  </p:clrMapOvr>
 </p:sld>
 </file>
 

</xml_diff>